<commit_message>
Souce code removed in ppt
</commit_message>
<xml_diff>
--- a/Project/Chest Pneumonia Detection 2.pptx
+++ b/Project/Chest Pneumonia Detection 2.pptx
@@ -10,15 +10,12 @@
     <p:sldId id="261" r:id="rId4"/>
     <p:sldId id="264" r:id="rId5"/>
     <p:sldId id="265" r:id="rId6"/>
-    <p:sldId id="266" r:id="rId7"/>
-    <p:sldId id="267" r:id="rId8"/>
-    <p:sldId id="270" r:id="rId9"/>
-    <p:sldId id="268" r:id="rId10"/>
-    <p:sldId id="269" r:id="rId11"/>
-    <p:sldId id="271" r:id="rId12"/>
-    <p:sldId id="272" r:id="rId13"/>
-    <p:sldId id="273" r:id="rId14"/>
-    <p:sldId id="263" r:id="rId15"/>
+    <p:sldId id="270" r:id="rId7"/>
+    <p:sldId id="268" r:id="rId8"/>
+    <p:sldId id="271" r:id="rId9"/>
+    <p:sldId id="272" r:id="rId10"/>
+    <p:sldId id="273" r:id="rId11"/>
+    <p:sldId id="263" r:id="rId12"/>
   </p:sldIdLst>
   <p:sldSz cx="12192000" cy="6858000"/>
   <p:notesSz cx="6858000" cy="9144000"/>
@@ -10766,7 +10763,7 @@
           <a:p>
             <a:fld id="{5F71AB72-B2C5-44B5-90C7-8DCE8540FC7A}" type="datetimeFigureOut">
               <a:rPr lang="en-IN" smtClean="0"/>
-              <a:t>28-06-2020</a:t>
+              <a:t>29-06-2020</a:t>
             </a:fld>
             <a:endParaRPr lang="en-IN"/>
           </a:p>
@@ -10969,7 +10966,7 @@
           <a:p>
             <a:fld id="{5F71AB72-B2C5-44B5-90C7-8DCE8540FC7A}" type="datetimeFigureOut">
               <a:rPr lang="en-IN" smtClean="0"/>
-              <a:t>28-06-2020</a:t>
+              <a:t>29-06-2020</a:t>
             </a:fld>
             <a:endParaRPr lang="en-IN"/>
           </a:p>
@@ -11182,7 +11179,7 @@
           <a:p>
             <a:fld id="{5F71AB72-B2C5-44B5-90C7-8DCE8540FC7A}" type="datetimeFigureOut">
               <a:rPr lang="en-IN" smtClean="0"/>
-              <a:t>28-06-2020</a:t>
+              <a:t>29-06-2020</a:t>
             </a:fld>
             <a:endParaRPr lang="en-IN"/>
           </a:p>
@@ -11385,7 +11382,7 @@
           <a:p>
             <a:fld id="{5F71AB72-B2C5-44B5-90C7-8DCE8540FC7A}" type="datetimeFigureOut">
               <a:rPr lang="en-IN" smtClean="0"/>
-              <a:t>28-06-2020</a:t>
+              <a:t>29-06-2020</a:t>
             </a:fld>
             <a:endParaRPr lang="en-IN"/>
           </a:p>
@@ -11664,7 +11661,7 @@
           <a:p>
             <a:fld id="{5F71AB72-B2C5-44B5-90C7-8DCE8540FC7A}" type="datetimeFigureOut">
               <a:rPr lang="en-IN" smtClean="0"/>
-              <a:t>28-06-2020</a:t>
+              <a:t>29-06-2020</a:t>
             </a:fld>
             <a:endParaRPr lang="en-IN"/>
           </a:p>
@@ -11935,7 +11932,7 @@
           <a:p>
             <a:fld id="{5F71AB72-B2C5-44B5-90C7-8DCE8540FC7A}" type="datetimeFigureOut">
               <a:rPr lang="en-IN" smtClean="0"/>
-              <a:t>28-06-2020</a:t>
+              <a:t>29-06-2020</a:t>
             </a:fld>
             <a:endParaRPr lang="en-IN"/>
           </a:p>
@@ -12357,7 +12354,7 @@
           <a:p>
             <a:fld id="{5F71AB72-B2C5-44B5-90C7-8DCE8540FC7A}" type="datetimeFigureOut">
               <a:rPr lang="en-IN" smtClean="0"/>
-              <a:t>28-06-2020</a:t>
+              <a:t>29-06-2020</a:t>
             </a:fld>
             <a:endParaRPr lang="en-IN"/>
           </a:p>
@@ -12502,7 +12499,7 @@
           <a:p>
             <a:fld id="{5F71AB72-B2C5-44B5-90C7-8DCE8540FC7A}" type="datetimeFigureOut">
               <a:rPr lang="en-IN" smtClean="0"/>
-              <a:t>28-06-2020</a:t>
+              <a:t>29-06-2020</a:t>
             </a:fld>
             <a:endParaRPr lang="en-IN"/>
           </a:p>
@@ -12618,7 +12615,7 @@
           <a:p>
             <a:fld id="{5F71AB72-B2C5-44B5-90C7-8DCE8540FC7A}" type="datetimeFigureOut">
               <a:rPr lang="en-IN" smtClean="0"/>
-              <a:t>28-06-2020</a:t>
+              <a:t>29-06-2020</a:t>
             </a:fld>
             <a:endParaRPr lang="en-IN"/>
           </a:p>
@@ -12934,7 +12931,7 @@
           <a:p>
             <a:fld id="{5F71AB72-B2C5-44B5-90C7-8DCE8540FC7A}" type="datetimeFigureOut">
               <a:rPr lang="en-IN" smtClean="0"/>
-              <a:t>28-06-2020</a:t>
+              <a:t>29-06-2020</a:t>
             </a:fld>
             <a:endParaRPr lang="en-IN"/>
           </a:p>
@@ -13226,7 +13223,7 @@
           <a:p>
             <a:fld id="{5F71AB72-B2C5-44B5-90C7-8DCE8540FC7A}" type="datetimeFigureOut">
               <a:rPr lang="en-IN" smtClean="0"/>
-              <a:t>28-06-2020</a:t>
+              <a:t>29-06-2020</a:t>
             </a:fld>
             <a:endParaRPr lang="en-IN"/>
           </a:p>
@@ -13491,7 +13488,7 @@
           <a:p>
             <a:fld id="{5F71AB72-B2C5-44B5-90C7-8DCE8540FC7A}" type="datetimeFigureOut">
               <a:rPr lang="en-IN" smtClean="0"/>
-              <a:t>28-06-2020</a:t>
+              <a:t>29-06-2020</a:t>
             </a:fld>
             <a:endParaRPr lang="en-IN"/>
           </a:p>
@@ -14050,531 +14047,6 @@
       </p:grpSpPr>
       <p:sp>
         <p:nvSpPr>
-          <p:cNvPr id="7" name="Title 6">
-            <a:extLst>
-              <a:ext uri="{FF2B5EF4-FFF2-40B4-BE49-F238E27FC236}">
-                <a16:creationId xmlns:a16="http://schemas.microsoft.com/office/drawing/2014/main" id="{1621D6ED-DD80-48C7-82B4-111491A51596}"/>
-              </a:ext>
-            </a:extLst>
-          </p:cNvPr>
-          <p:cNvSpPr>
-            <a:spLocks noGrp="1"/>
-          </p:cNvSpPr>
-          <p:nvPr>
-            <p:ph type="title"/>
-          </p:nvPr>
-        </p:nvSpPr>
-        <p:spPr/>
-        <p:txBody>
-          <a:bodyPr/>
-          <a:lstStyle/>
-          <a:p>
-            <a:r>
-              <a:rPr lang="en-IN" dirty="0"/>
-              <a:t>Image Samples – Setting up the plot</a:t>
-            </a:r>
-          </a:p>
-        </p:txBody>
-      </p:sp>
-      <p:pic>
-        <p:nvPicPr>
-          <p:cNvPr id="10" name="Content Placeholder 9">
-            <a:extLst>
-              <a:ext uri="{FF2B5EF4-FFF2-40B4-BE49-F238E27FC236}">
-                <a16:creationId xmlns:a16="http://schemas.microsoft.com/office/drawing/2014/main" id="{D4A2AB6D-A181-4F23-BC8C-401B5FFDC798}"/>
-              </a:ext>
-            </a:extLst>
-          </p:cNvPr>
-          <p:cNvPicPr>
-            <a:picLocks noGrp="1" noChangeAspect="1"/>
-          </p:cNvPicPr>
-          <p:nvPr>
-            <p:ph idx="1"/>
-          </p:nvPr>
-        </p:nvPicPr>
-        <p:blipFill>
-          <a:blip r:embed="rId2">
-            <a:extLst>
-              <a:ext uri="{BEBA8EAE-BF5A-486C-A8C5-ECC9F3942E4B}">
-                <a14:imgProps xmlns:a14="http://schemas.microsoft.com/office/drawing/2010/main">
-                  <a14:imgLayer r:embed="rId3">
-                    <a14:imgEffect>
-                      <a14:backgroundRemoval t="9977" b="89789" l="5168" r="95478"/>
-                    </a14:imgEffect>
-                  </a14:imgLayer>
-                </a14:imgProps>
-              </a:ext>
-              <a:ext uri="{28A0092B-C50C-407E-A947-70E740481C1C}">
-                <a14:useLocalDpi xmlns:a14="http://schemas.microsoft.com/office/drawing/2010/main" val="0"/>
-              </a:ext>
-            </a:extLst>
-          </a:blip>
-          <a:stretch>
-            <a:fillRect/>
-          </a:stretch>
-        </p:blipFill>
-        <p:spPr>
-          <a:xfrm>
-            <a:off x="2143024" y="1825625"/>
-            <a:ext cx="7905952" cy="4351338"/>
-          </a:xfrm>
-        </p:spPr>
-      </p:pic>
-    </p:spTree>
-    <p:extLst>
-      <p:ext uri="{BB962C8B-B14F-4D97-AF65-F5344CB8AC3E}">
-        <p14:creationId xmlns:p14="http://schemas.microsoft.com/office/powerpoint/2010/main" val="3168592157"/>
-      </p:ext>
-    </p:extLst>
-  </p:cSld>
-  <p:clrMapOvr>
-    <a:masterClrMapping/>
-  </p:clrMapOvr>
-  <p:transition spd="slow">
-    <p:cover/>
-  </p:transition>
-</p:sld>
-</file>
-
-<file path=ppt/slides/slide11.xml><?xml version="1.0" encoding="utf-8"?>
-<p:sld xmlns:a="http://schemas.openxmlformats.org/drawingml/2006/main" xmlns:r="http://schemas.openxmlformats.org/officeDocument/2006/relationships" xmlns:p="http://schemas.openxmlformats.org/presentationml/2006/main">
-  <p:cSld>
-    <p:spTree>
-      <p:nvGrpSpPr>
-        <p:cNvPr id="1" name=""/>
-        <p:cNvGrpSpPr/>
-        <p:nvPr/>
-      </p:nvGrpSpPr>
-      <p:grpSpPr>
-        <a:xfrm>
-          <a:off x="0" y="0"/>
-          <a:ext cx="0" cy="0"/>
-          <a:chOff x="0" y="0"/>
-          <a:chExt cx="0" cy="0"/>
-        </a:xfrm>
-      </p:grpSpPr>
-      <p:sp>
-        <p:nvSpPr>
-          <p:cNvPr id="2" name="Title 1">
-            <a:extLst>
-              <a:ext uri="{FF2B5EF4-FFF2-40B4-BE49-F238E27FC236}">
-                <a16:creationId xmlns:a16="http://schemas.microsoft.com/office/drawing/2014/main" id="{ACAD600F-FC22-461F-978C-8BC3CDF34B30}"/>
-              </a:ext>
-            </a:extLst>
-          </p:cNvPr>
-          <p:cNvSpPr>
-            <a:spLocks noGrp="1"/>
-          </p:cNvSpPr>
-          <p:nvPr>
-            <p:ph type="title"/>
-          </p:nvPr>
-        </p:nvSpPr>
-        <p:spPr/>
-        <p:txBody>
-          <a:bodyPr/>
-          <a:lstStyle/>
-          <a:p>
-            <a:r>
-              <a:rPr lang="en-IN" dirty="0"/>
-              <a:t>Normal X-Ray Samples</a:t>
-            </a:r>
-          </a:p>
-        </p:txBody>
-      </p:sp>
-      <p:sp>
-        <p:nvSpPr>
-          <p:cNvPr id="6" name="Text Placeholder 5">
-            <a:extLst>
-              <a:ext uri="{FF2B5EF4-FFF2-40B4-BE49-F238E27FC236}">
-                <a16:creationId xmlns:a16="http://schemas.microsoft.com/office/drawing/2014/main" id="{379D718D-AE16-44BE-BFF0-42B18BDF94F9}"/>
-              </a:ext>
-            </a:extLst>
-          </p:cNvPr>
-          <p:cNvSpPr>
-            <a:spLocks noGrp="1"/>
-          </p:cNvSpPr>
-          <p:nvPr>
-            <p:ph type="body" idx="1"/>
-          </p:nvPr>
-        </p:nvSpPr>
-        <p:spPr/>
-        <p:txBody>
-          <a:bodyPr/>
-          <a:lstStyle/>
-          <a:p>
-            <a:r>
-              <a:rPr lang="en-IN" dirty="0"/>
-              <a:t>Source Code</a:t>
-            </a:r>
-          </a:p>
-        </p:txBody>
-      </p:sp>
-      <p:pic>
-        <p:nvPicPr>
-          <p:cNvPr id="11" name="Content Placeholder 10">
-            <a:extLst>
-              <a:ext uri="{FF2B5EF4-FFF2-40B4-BE49-F238E27FC236}">
-                <a16:creationId xmlns:a16="http://schemas.microsoft.com/office/drawing/2014/main" id="{EDCE9782-F9DD-4C17-BF56-17E643EF027B}"/>
-              </a:ext>
-            </a:extLst>
-          </p:cNvPr>
-          <p:cNvPicPr>
-            <a:picLocks noGrp="1" noChangeAspect="1"/>
-          </p:cNvPicPr>
-          <p:nvPr>
-            <p:ph sz="half" idx="2"/>
-          </p:nvPr>
-        </p:nvPicPr>
-        <p:blipFill>
-          <a:blip r:embed="rId2">
-            <a:extLst>
-              <a:ext uri="{BEBA8EAE-BF5A-486C-A8C5-ECC9F3942E4B}">
-                <a14:imgProps xmlns:a14="http://schemas.microsoft.com/office/drawing/2010/main">
-                  <a14:imgLayer r:embed="rId3">
-                    <a14:imgEffect>
-                      <a14:backgroundRemoval t="10000" b="90000" l="7301" r="92445"/>
-                    </a14:imgEffect>
-                  </a14:imgLayer>
-                </a14:imgProps>
-              </a:ext>
-              <a:ext uri="{28A0092B-C50C-407E-A947-70E740481C1C}">
-                <a14:useLocalDpi xmlns:a14="http://schemas.microsoft.com/office/drawing/2010/main" val="0"/>
-              </a:ext>
-            </a:extLst>
-          </a:blip>
-          <a:stretch>
-            <a:fillRect/>
-          </a:stretch>
-        </p:blipFill>
-        <p:spPr>
-          <a:xfrm>
-            <a:off x="839788" y="2727351"/>
-            <a:ext cx="5157787" cy="3240035"/>
-          </a:xfrm>
-        </p:spPr>
-      </p:pic>
-      <p:sp>
-        <p:nvSpPr>
-          <p:cNvPr id="8" name="Text Placeholder 7">
-            <a:extLst>
-              <a:ext uri="{FF2B5EF4-FFF2-40B4-BE49-F238E27FC236}">
-                <a16:creationId xmlns:a16="http://schemas.microsoft.com/office/drawing/2014/main" id="{DFE6C037-D1A1-48C3-91EA-9411603A333D}"/>
-              </a:ext>
-            </a:extLst>
-          </p:cNvPr>
-          <p:cNvSpPr>
-            <a:spLocks noGrp="1"/>
-          </p:cNvSpPr>
-          <p:nvPr>
-            <p:ph type="body" sz="quarter" idx="3"/>
-          </p:nvPr>
-        </p:nvSpPr>
-        <p:spPr/>
-        <p:txBody>
-          <a:bodyPr/>
-          <a:lstStyle/>
-          <a:p>
-            <a:r>
-              <a:rPr lang="en-IN" dirty="0"/>
-              <a:t>Output</a:t>
-            </a:r>
-          </a:p>
-        </p:txBody>
-      </p:sp>
-      <p:pic>
-        <p:nvPicPr>
-          <p:cNvPr id="1026" name="Picture 2">
-            <a:extLst>
-              <a:ext uri="{FF2B5EF4-FFF2-40B4-BE49-F238E27FC236}">
-                <a16:creationId xmlns:a16="http://schemas.microsoft.com/office/drawing/2014/main" id="{1E04CBB1-9B46-42D9-BD6A-7CBD96453696}"/>
-              </a:ext>
-            </a:extLst>
-          </p:cNvPr>
-          <p:cNvPicPr>
-            <a:picLocks noGrp="1" noChangeAspect="1" noChangeArrowheads="1"/>
-          </p:cNvPicPr>
-          <p:nvPr>
-            <p:ph sz="quarter" idx="4"/>
-          </p:nvPr>
-        </p:nvPicPr>
-        <p:blipFill>
-          <a:blip r:embed="rId4">
-            <a:extLst>
-              <a:ext uri="{28A0092B-C50C-407E-A947-70E740481C1C}">
-                <a14:useLocalDpi xmlns:a14="http://schemas.microsoft.com/office/drawing/2010/main" val="0"/>
-              </a:ext>
-            </a:extLst>
-          </a:blip>
-          <a:srcRect/>
-          <a:stretch>
-            <a:fillRect/>
-          </a:stretch>
-        </p:blipFill>
-        <p:spPr bwMode="auto">
-          <a:xfrm>
-            <a:off x="6172200" y="3138720"/>
-            <a:ext cx="5183188" cy="2417297"/>
-          </a:xfrm>
-          <a:prstGeom prst="rect">
-            <a:avLst/>
-          </a:prstGeom>
-          <a:noFill/>
-          <a:extLst>
-            <a:ext uri="{909E8E84-426E-40DD-AFC4-6F175D3DCCD1}">
-              <a14:hiddenFill xmlns:a14="http://schemas.microsoft.com/office/drawing/2010/main">
-                <a:solidFill>
-                  <a:srgbClr val="FFFFFF"/>
-                </a:solidFill>
-              </a14:hiddenFill>
-            </a:ext>
-          </a:extLst>
-        </p:spPr>
-      </p:pic>
-    </p:spTree>
-    <p:extLst>
-      <p:ext uri="{BB962C8B-B14F-4D97-AF65-F5344CB8AC3E}">
-        <p14:creationId xmlns:p14="http://schemas.microsoft.com/office/powerpoint/2010/main" val="3696035557"/>
-      </p:ext>
-    </p:extLst>
-  </p:cSld>
-  <p:clrMapOvr>
-    <a:masterClrMapping/>
-  </p:clrMapOvr>
-  <p:transition spd="slow">
-    <p:cover/>
-  </p:transition>
-</p:sld>
-</file>
-
-<file path=ppt/slides/slide12.xml><?xml version="1.0" encoding="utf-8"?>
-<p:sld xmlns:a="http://schemas.openxmlformats.org/drawingml/2006/main" xmlns:r="http://schemas.openxmlformats.org/officeDocument/2006/relationships" xmlns:p="http://schemas.openxmlformats.org/presentationml/2006/main">
-  <p:cSld>
-    <p:spTree>
-      <p:nvGrpSpPr>
-        <p:cNvPr id="1" name=""/>
-        <p:cNvGrpSpPr/>
-        <p:nvPr/>
-      </p:nvGrpSpPr>
-      <p:grpSpPr>
-        <a:xfrm>
-          <a:off x="0" y="0"/>
-          <a:ext cx="0" cy="0"/>
-          <a:chOff x="0" y="0"/>
-          <a:chExt cx="0" cy="0"/>
-        </a:xfrm>
-      </p:grpSpPr>
-      <p:sp>
-        <p:nvSpPr>
-          <p:cNvPr id="2" name="Title 1">
-            <a:extLst>
-              <a:ext uri="{FF2B5EF4-FFF2-40B4-BE49-F238E27FC236}">
-                <a16:creationId xmlns:a16="http://schemas.microsoft.com/office/drawing/2014/main" id="{DF88A35C-B14B-4FB6-A8FF-224D339BC14E}"/>
-              </a:ext>
-            </a:extLst>
-          </p:cNvPr>
-          <p:cNvSpPr>
-            <a:spLocks noGrp="1"/>
-          </p:cNvSpPr>
-          <p:nvPr>
-            <p:ph type="title"/>
-          </p:nvPr>
-        </p:nvSpPr>
-        <p:spPr/>
-        <p:txBody>
-          <a:bodyPr/>
-          <a:lstStyle/>
-          <a:p>
-            <a:r>
-              <a:rPr lang="en-IN" dirty="0"/>
-              <a:t>Pneumonia X-Ray Samples</a:t>
-            </a:r>
-          </a:p>
-        </p:txBody>
-      </p:sp>
-      <p:sp>
-        <p:nvSpPr>
-          <p:cNvPr id="3" name="Text Placeholder 2">
-            <a:extLst>
-              <a:ext uri="{FF2B5EF4-FFF2-40B4-BE49-F238E27FC236}">
-                <a16:creationId xmlns:a16="http://schemas.microsoft.com/office/drawing/2014/main" id="{E704CA05-6B47-4DD7-9275-3298923371F3}"/>
-              </a:ext>
-            </a:extLst>
-          </p:cNvPr>
-          <p:cNvSpPr>
-            <a:spLocks noGrp="1"/>
-          </p:cNvSpPr>
-          <p:nvPr>
-            <p:ph type="body" idx="1"/>
-          </p:nvPr>
-        </p:nvSpPr>
-        <p:spPr/>
-        <p:txBody>
-          <a:bodyPr/>
-          <a:lstStyle/>
-          <a:p>
-            <a:r>
-              <a:rPr lang="en-IN" dirty="0"/>
-              <a:t>Source Code</a:t>
-            </a:r>
-          </a:p>
-        </p:txBody>
-      </p:sp>
-      <p:pic>
-        <p:nvPicPr>
-          <p:cNvPr id="8" name="Content Placeholder 7">
-            <a:extLst>
-              <a:ext uri="{FF2B5EF4-FFF2-40B4-BE49-F238E27FC236}">
-                <a16:creationId xmlns:a16="http://schemas.microsoft.com/office/drawing/2014/main" id="{050BFDC5-83D4-4103-A934-BAEACF80A334}"/>
-              </a:ext>
-            </a:extLst>
-          </p:cNvPr>
-          <p:cNvPicPr>
-            <a:picLocks noGrp="1" noChangeAspect="1"/>
-          </p:cNvPicPr>
-          <p:nvPr>
-            <p:ph sz="half" idx="2"/>
-          </p:nvPr>
-        </p:nvPicPr>
-        <p:blipFill>
-          <a:blip r:embed="rId2">
-            <a:extLst>
-              <a:ext uri="{BEBA8EAE-BF5A-486C-A8C5-ECC9F3942E4B}">
-                <a14:imgProps xmlns:a14="http://schemas.microsoft.com/office/drawing/2010/main">
-                  <a14:imgLayer r:embed="rId3">
-                    <a14:imgEffect>
-                      <a14:backgroundRemoval t="9769" b="89846" l="5263" r="94652"/>
-                    </a14:imgEffect>
-                  </a14:imgLayer>
-                </a14:imgProps>
-              </a:ext>
-              <a:ext uri="{28A0092B-C50C-407E-A947-70E740481C1C}">
-                <a14:useLocalDpi xmlns:a14="http://schemas.microsoft.com/office/drawing/2010/main" val="0"/>
-              </a:ext>
-            </a:extLst>
-          </a:blip>
-          <a:stretch>
-            <a:fillRect/>
-          </a:stretch>
-        </p:blipFill>
-        <p:spPr>
-          <a:xfrm>
-            <a:off x="839788" y="2644161"/>
-            <a:ext cx="5157787" cy="3406416"/>
-          </a:xfrm>
-        </p:spPr>
-      </p:pic>
-      <p:sp>
-        <p:nvSpPr>
-          <p:cNvPr id="5" name="Text Placeholder 4">
-            <a:extLst>
-              <a:ext uri="{FF2B5EF4-FFF2-40B4-BE49-F238E27FC236}">
-                <a16:creationId xmlns:a16="http://schemas.microsoft.com/office/drawing/2014/main" id="{A60C6959-5EBC-4316-B305-C6D800973E7A}"/>
-              </a:ext>
-            </a:extLst>
-          </p:cNvPr>
-          <p:cNvSpPr>
-            <a:spLocks noGrp="1"/>
-          </p:cNvSpPr>
-          <p:nvPr>
-            <p:ph type="body" sz="quarter" idx="3"/>
-          </p:nvPr>
-        </p:nvSpPr>
-        <p:spPr/>
-        <p:txBody>
-          <a:bodyPr/>
-          <a:lstStyle/>
-          <a:p>
-            <a:r>
-              <a:rPr lang="en-IN" dirty="0"/>
-              <a:t>Output</a:t>
-            </a:r>
-          </a:p>
-        </p:txBody>
-      </p:sp>
-      <p:pic>
-        <p:nvPicPr>
-          <p:cNvPr id="2050" name="Picture 2">
-            <a:extLst>
-              <a:ext uri="{FF2B5EF4-FFF2-40B4-BE49-F238E27FC236}">
-                <a16:creationId xmlns:a16="http://schemas.microsoft.com/office/drawing/2014/main" id="{B55C4DA4-37D2-45D6-9177-6BAF26777A8D}"/>
-              </a:ext>
-            </a:extLst>
-          </p:cNvPr>
-          <p:cNvPicPr>
-            <a:picLocks noGrp="1" noChangeAspect="1" noChangeArrowheads="1"/>
-          </p:cNvPicPr>
-          <p:nvPr>
-            <p:ph sz="quarter" idx="4"/>
-          </p:nvPr>
-        </p:nvPicPr>
-        <p:blipFill>
-          <a:blip r:embed="rId4">
-            <a:extLst>
-              <a:ext uri="{28A0092B-C50C-407E-A947-70E740481C1C}">
-                <a14:useLocalDpi xmlns:a14="http://schemas.microsoft.com/office/drawing/2010/main" val="0"/>
-              </a:ext>
-            </a:extLst>
-          </a:blip>
-          <a:srcRect/>
-          <a:stretch>
-            <a:fillRect/>
-          </a:stretch>
-        </p:blipFill>
-        <p:spPr bwMode="auto">
-          <a:xfrm>
-            <a:off x="6172200" y="3195867"/>
-            <a:ext cx="5183188" cy="2303003"/>
-          </a:xfrm>
-          <a:prstGeom prst="rect">
-            <a:avLst/>
-          </a:prstGeom>
-          <a:noFill/>
-          <a:extLst>
-            <a:ext uri="{909E8E84-426E-40DD-AFC4-6F175D3DCCD1}">
-              <a14:hiddenFill xmlns:a14="http://schemas.microsoft.com/office/drawing/2010/main">
-                <a:solidFill>
-                  <a:srgbClr val="FFFFFF"/>
-                </a:solidFill>
-              </a14:hiddenFill>
-            </a:ext>
-          </a:extLst>
-        </p:spPr>
-      </p:pic>
-    </p:spTree>
-    <p:extLst>
-      <p:ext uri="{BB962C8B-B14F-4D97-AF65-F5344CB8AC3E}">
-        <p14:creationId xmlns:p14="http://schemas.microsoft.com/office/powerpoint/2010/main" val="1688930048"/>
-      </p:ext>
-    </p:extLst>
-  </p:cSld>
-  <p:clrMapOvr>
-    <a:masterClrMapping/>
-  </p:clrMapOvr>
-  <p:transition spd="slow">
-    <p:cover/>
-  </p:transition>
-</p:sld>
-</file>
-
-<file path=ppt/slides/slide13.xml><?xml version="1.0" encoding="utf-8"?>
-<p:sld xmlns:a="http://schemas.openxmlformats.org/drawingml/2006/main" xmlns:r="http://schemas.openxmlformats.org/officeDocument/2006/relationships" xmlns:p="http://schemas.openxmlformats.org/presentationml/2006/main">
-  <p:cSld>
-    <p:spTree>
-      <p:nvGrpSpPr>
-        <p:cNvPr id="1" name=""/>
-        <p:cNvGrpSpPr/>
-        <p:nvPr/>
-      </p:nvGrpSpPr>
-      <p:grpSpPr>
-        <a:xfrm>
-          <a:off x="0" y="0"/>
-          <a:ext cx="0" cy="0"/>
-          <a:chOff x="0" y="0"/>
-          <a:chExt cx="0" cy="0"/>
-        </a:xfrm>
-      </p:grpSpPr>
-      <p:sp>
-        <p:nvSpPr>
           <p:cNvPr id="2" name="Title 1">
             <a:extLst>
               <a:ext uri="{FF2B5EF4-FFF2-40B4-BE49-F238E27FC236}">
@@ -14601,106 +14073,6 @@
           </a:p>
         </p:txBody>
       </p:sp>
-      <p:sp>
-        <p:nvSpPr>
-          <p:cNvPr id="3" name="Text Placeholder 2">
-            <a:extLst>
-              <a:ext uri="{FF2B5EF4-FFF2-40B4-BE49-F238E27FC236}">
-                <a16:creationId xmlns:a16="http://schemas.microsoft.com/office/drawing/2014/main" id="{7BC1F379-DD89-48BF-9C4B-C5C436B617C3}"/>
-              </a:ext>
-            </a:extLst>
-          </p:cNvPr>
-          <p:cNvSpPr>
-            <a:spLocks noGrp="1"/>
-          </p:cNvSpPr>
-          <p:nvPr>
-            <p:ph type="body" idx="1"/>
-          </p:nvPr>
-        </p:nvSpPr>
-        <p:spPr/>
-        <p:txBody>
-          <a:bodyPr/>
-          <a:lstStyle/>
-          <a:p>
-            <a:r>
-              <a:rPr lang="en-IN" dirty="0"/>
-              <a:t>Source Code</a:t>
-            </a:r>
-          </a:p>
-        </p:txBody>
-      </p:sp>
-      <p:pic>
-        <p:nvPicPr>
-          <p:cNvPr id="8" name="Content Placeholder 7">
-            <a:extLst>
-              <a:ext uri="{FF2B5EF4-FFF2-40B4-BE49-F238E27FC236}">
-                <a16:creationId xmlns:a16="http://schemas.microsoft.com/office/drawing/2014/main" id="{845A0988-0F98-46CD-8AB9-E3A48CCBC804}"/>
-              </a:ext>
-            </a:extLst>
-          </p:cNvPr>
-          <p:cNvPicPr>
-            <a:picLocks noGrp="1" noChangeAspect="1"/>
-          </p:cNvPicPr>
-          <p:nvPr>
-            <p:ph sz="half" idx="2"/>
-          </p:nvPr>
-        </p:nvPicPr>
-        <p:blipFill>
-          <a:blip r:embed="rId2">
-            <a:extLst>
-              <a:ext uri="{BEBA8EAE-BF5A-486C-A8C5-ECC9F3942E4B}">
-                <a14:imgProps xmlns:a14="http://schemas.microsoft.com/office/drawing/2010/main">
-                  <a14:imgLayer r:embed="rId3">
-                    <a14:imgEffect>
-                      <a14:backgroundRemoval t="4412" b="94737" l="2979" r="98730"/>
-                    </a14:imgEffect>
-                  </a14:imgLayer>
-                </a14:imgProps>
-              </a:ext>
-              <a:ext uri="{28A0092B-C50C-407E-A947-70E740481C1C}">
-                <a14:useLocalDpi xmlns:a14="http://schemas.microsoft.com/office/drawing/2010/main" val="0"/>
-              </a:ext>
-            </a:extLst>
-          </a:blip>
-          <a:stretch>
-            <a:fillRect/>
-          </a:stretch>
-        </p:blipFill>
-        <p:spPr>
-          <a:xfrm>
-            <a:off x="839788" y="2720450"/>
-            <a:ext cx="5157787" cy="3253838"/>
-          </a:xfrm>
-        </p:spPr>
-      </p:pic>
-      <p:sp>
-        <p:nvSpPr>
-          <p:cNvPr id="5" name="Text Placeholder 4">
-            <a:extLst>
-              <a:ext uri="{FF2B5EF4-FFF2-40B4-BE49-F238E27FC236}">
-                <a16:creationId xmlns:a16="http://schemas.microsoft.com/office/drawing/2014/main" id="{2CE2CDD5-2407-4AEC-86FD-141D688511E0}"/>
-              </a:ext>
-            </a:extLst>
-          </p:cNvPr>
-          <p:cNvSpPr>
-            <a:spLocks noGrp="1"/>
-          </p:cNvSpPr>
-          <p:nvPr>
-            <p:ph type="body" sz="quarter" idx="3"/>
-          </p:nvPr>
-        </p:nvSpPr>
-        <p:spPr/>
-        <p:txBody>
-          <a:bodyPr/>
-          <a:lstStyle/>
-          <a:p>
-            <a:r>
-              <a:rPr lang="en-IN" dirty="0"/>
-              <a:t>Output</a:t>
-            </a:r>
-          </a:p>
-        </p:txBody>
-      </p:sp>
       <p:pic>
         <p:nvPicPr>
           <p:cNvPr id="10" name="Content Placeholder 9">
@@ -14714,15 +14086,15 @@
             <a:picLocks noGrp="1" noChangeAspect="1"/>
           </p:cNvPicPr>
           <p:nvPr>
-            <p:ph sz="quarter" idx="4"/>
+            <p:ph idx="1"/>
           </p:nvPr>
         </p:nvPicPr>
         <p:blipFill>
-          <a:blip r:embed="rId4">
+          <a:blip r:embed="rId2">
             <a:extLst>
               <a:ext uri="{BEBA8EAE-BF5A-486C-A8C5-ECC9F3942E4B}">
                 <a14:imgProps xmlns:a14="http://schemas.microsoft.com/office/drawing/2010/main">
-                  <a14:imgLayer r:embed="rId5">
+                  <a14:imgLayer r:embed="rId3">
                     <a14:imgEffect>
                       <a14:backgroundRemoval t="10000" b="90000" l="10000" r="90000"/>
                     </a14:imgEffect>
@@ -14740,8 +14112,8 @@
         </p:blipFill>
         <p:spPr>
           <a:xfrm>
-            <a:off x="6172200" y="3082922"/>
-            <a:ext cx="5183188" cy="2528894"/>
+            <a:off x="1636777" y="1825625"/>
+            <a:ext cx="8918445" cy="4351338"/>
           </a:xfrm>
         </p:spPr>
       </p:pic>
@@ -14761,7 +14133,7 @@
 </p:sld>
 </file>
 
-<file path=ppt/slides/slide14.xml><?xml version="1.0" encoding="utf-8"?>
+<file path=ppt/slides/slide11.xml><?xml version="1.0" encoding="utf-8"?>
 <p:sld xmlns:a="http://schemas.openxmlformats.org/drawingml/2006/main" xmlns:r="http://schemas.openxmlformats.org/officeDocument/2006/relationships" xmlns:p="http://schemas.openxmlformats.org/presentationml/2006/main">
   <p:cSld>
     <p:spTree>
@@ -15363,216 +14735,6 @@
           <p:cNvPr id="2" name="Title 1">
             <a:extLst>
               <a:ext uri="{FF2B5EF4-FFF2-40B4-BE49-F238E27FC236}">
-                <a16:creationId xmlns:a16="http://schemas.microsoft.com/office/drawing/2014/main" id="{F97496E4-5D32-4783-A441-2D313D16059D}"/>
-              </a:ext>
-            </a:extLst>
-          </p:cNvPr>
-          <p:cNvSpPr>
-            <a:spLocks noGrp="1"/>
-          </p:cNvSpPr>
-          <p:nvPr>
-            <p:ph type="title"/>
-          </p:nvPr>
-        </p:nvSpPr>
-        <p:spPr/>
-        <p:txBody>
-          <a:bodyPr/>
-          <a:lstStyle/>
-          <a:p>
-            <a:r>
-              <a:rPr lang="en-IN" dirty="0"/>
-              <a:t>Fetching The Dataset</a:t>
-            </a:r>
-          </a:p>
-        </p:txBody>
-      </p:sp>
-      <p:pic>
-        <p:nvPicPr>
-          <p:cNvPr id="5" name="Content Placeholder 4">
-            <a:extLst>
-              <a:ext uri="{FF2B5EF4-FFF2-40B4-BE49-F238E27FC236}">
-                <a16:creationId xmlns:a16="http://schemas.microsoft.com/office/drawing/2014/main" id="{D9DE7DB4-15B8-4075-9F3B-A85ED0336927}"/>
-              </a:ext>
-            </a:extLst>
-          </p:cNvPr>
-          <p:cNvPicPr>
-            <a:picLocks noGrp="1" noChangeAspect="1"/>
-          </p:cNvPicPr>
-          <p:nvPr>
-            <p:ph idx="1"/>
-          </p:nvPr>
-        </p:nvPicPr>
-        <p:blipFill>
-          <a:blip r:embed="rId2">
-            <a:extLst>
-              <a:ext uri="{BEBA8EAE-BF5A-486C-A8C5-ECC9F3942E4B}">
-                <a14:imgProps xmlns:a14="http://schemas.microsoft.com/office/drawing/2010/main">
-                  <a14:imgLayer r:embed="rId3">
-                    <a14:imgEffect>
-                      <a14:backgroundRemoval t="10000" b="90000" l="5664" r="97902"/>
-                    </a14:imgEffect>
-                  </a14:imgLayer>
-                </a14:imgProps>
-              </a:ext>
-              <a:ext uri="{28A0092B-C50C-407E-A947-70E740481C1C}">
-                <a14:useLocalDpi xmlns:a14="http://schemas.microsoft.com/office/drawing/2010/main" val="0"/>
-              </a:ext>
-            </a:extLst>
-          </a:blip>
-          <a:stretch>
-            <a:fillRect/>
-          </a:stretch>
-        </p:blipFill>
-        <p:spPr>
-          <a:xfrm>
-            <a:off x="1891667" y="1825625"/>
-            <a:ext cx="8408666" cy="4351338"/>
-          </a:xfrm>
-        </p:spPr>
-      </p:pic>
-    </p:spTree>
-    <p:extLst>
-      <p:ext uri="{BB962C8B-B14F-4D97-AF65-F5344CB8AC3E}">
-        <p14:creationId xmlns:p14="http://schemas.microsoft.com/office/powerpoint/2010/main" val="2457732944"/>
-      </p:ext>
-    </p:extLst>
-  </p:cSld>
-  <p:clrMapOvr>
-    <a:masterClrMapping/>
-  </p:clrMapOvr>
-  <p:transition spd="slow">
-    <p:cover/>
-  </p:transition>
-</p:sld>
-</file>
-
-<file path=ppt/slides/slide7.xml><?xml version="1.0" encoding="utf-8"?>
-<p:sld xmlns:a="http://schemas.openxmlformats.org/drawingml/2006/main" xmlns:r="http://schemas.openxmlformats.org/officeDocument/2006/relationships" xmlns:p="http://schemas.openxmlformats.org/presentationml/2006/main">
-  <p:cSld>
-    <p:spTree>
-      <p:nvGrpSpPr>
-        <p:cNvPr id="1" name=""/>
-        <p:cNvGrpSpPr/>
-        <p:nvPr/>
-      </p:nvGrpSpPr>
-      <p:grpSpPr>
-        <a:xfrm>
-          <a:off x="0" y="0"/>
-          <a:ext cx="0" cy="0"/>
-          <a:chOff x="0" y="0"/>
-          <a:chExt cx="0" cy="0"/>
-        </a:xfrm>
-      </p:grpSpPr>
-      <p:sp>
-        <p:nvSpPr>
-          <p:cNvPr id="2" name="Title 1">
-            <a:extLst>
-              <a:ext uri="{FF2B5EF4-FFF2-40B4-BE49-F238E27FC236}">
-                <a16:creationId xmlns:a16="http://schemas.microsoft.com/office/drawing/2014/main" id="{96ACA5F4-1415-437C-BD8A-322B6EBBB89C}"/>
-              </a:ext>
-            </a:extLst>
-          </p:cNvPr>
-          <p:cNvSpPr>
-            <a:spLocks noGrp="1"/>
-          </p:cNvSpPr>
-          <p:nvPr>
-            <p:ph type="title"/>
-          </p:nvPr>
-        </p:nvSpPr>
-        <p:spPr/>
-        <p:txBody>
-          <a:bodyPr/>
-          <a:lstStyle/>
-          <a:p>
-            <a:r>
-              <a:rPr lang="en-IN" dirty="0"/>
-              <a:t>Setting up the variables</a:t>
-            </a:r>
-          </a:p>
-        </p:txBody>
-      </p:sp>
-      <p:pic>
-        <p:nvPicPr>
-          <p:cNvPr id="5" name="Content Placeholder 4">
-            <a:extLst>
-              <a:ext uri="{FF2B5EF4-FFF2-40B4-BE49-F238E27FC236}">
-                <a16:creationId xmlns:a16="http://schemas.microsoft.com/office/drawing/2014/main" id="{B0860B5C-A449-46F5-809A-BFD3C4E5A8F6}"/>
-              </a:ext>
-            </a:extLst>
-          </p:cNvPr>
-          <p:cNvPicPr>
-            <a:picLocks noGrp="1" noChangeAspect="1"/>
-          </p:cNvPicPr>
-          <p:nvPr>
-            <p:ph idx="1"/>
-          </p:nvPr>
-        </p:nvPicPr>
-        <p:blipFill>
-          <a:blip r:embed="rId2">
-            <a:extLst>
-              <a:ext uri="{BEBA8EAE-BF5A-486C-A8C5-ECC9F3942E4B}">
-                <a14:imgProps xmlns:a14="http://schemas.microsoft.com/office/drawing/2010/main">
-                  <a14:imgLayer r:embed="rId3">
-                    <a14:imgEffect>
-                      <a14:backgroundRemoval t="9795" b="93004" l="4297" r="96094"/>
-                    </a14:imgEffect>
-                  </a14:imgLayer>
-                </a14:imgProps>
-              </a:ext>
-              <a:ext uri="{28A0092B-C50C-407E-A947-70E740481C1C}">
-                <a14:useLocalDpi xmlns:a14="http://schemas.microsoft.com/office/drawing/2010/main" val="0"/>
-              </a:ext>
-            </a:extLst>
-          </a:blip>
-          <a:stretch>
-            <a:fillRect/>
-          </a:stretch>
-        </p:blipFill>
-        <p:spPr>
-          <a:xfrm>
-            <a:off x="1939498" y="1825625"/>
-            <a:ext cx="8313003" cy="4351338"/>
-          </a:xfrm>
-        </p:spPr>
-      </p:pic>
-    </p:spTree>
-    <p:extLst>
-      <p:ext uri="{BB962C8B-B14F-4D97-AF65-F5344CB8AC3E}">
-        <p14:creationId xmlns:p14="http://schemas.microsoft.com/office/powerpoint/2010/main" val="3286577979"/>
-      </p:ext>
-    </p:extLst>
-  </p:cSld>
-  <p:clrMapOvr>
-    <a:masterClrMapping/>
-  </p:clrMapOvr>
-  <p:transition spd="slow">
-    <p:cover/>
-  </p:transition>
-</p:sld>
-</file>
-
-<file path=ppt/slides/slide8.xml><?xml version="1.0" encoding="utf-8"?>
-<p:sld xmlns:a="http://schemas.openxmlformats.org/drawingml/2006/main" xmlns:r="http://schemas.openxmlformats.org/officeDocument/2006/relationships" xmlns:p="http://schemas.openxmlformats.org/presentationml/2006/main">
-  <p:cSld>
-    <p:spTree>
-      <p:nvGrpSpPr>
-        <p:cNvPr id="1" name=""/>
-        <p:cNvGrpSpPr/>
-        <p:nvPr/>
-      </p:nvGrpSpPr>
-      <p:grpSpPr>
-        <a:xfrm>
-          <a:off x="0" y="0"/>
-          <a:ext cx="0" cy="0"/>
-          <a:chOff x="0" y="0"/>
-          <a:chExt cx="0" cy="0"/>
-        </a:xfrm>
-      </p:grpSpPr>
-      <p:sp>
-        <p:nvSpPr>
-          <p:cNvPr id="2" name="Title 1">
-            <a:extLst>
-              <a:ext uri="{FF2B5EF4-FFF2-40B4-BE49-F238E27FC236}">
                 <a16:creationId xmlns:a16="http://schemas.microsoft.com/office/drawing/2014/main" id="{3EAB8F0A-9417-4E73-BFB9-A475224CF08E}"/>
               </a:ext>
             </a:extLst>
@@ -15596,106 +14758,6 @@
           </a:p>
         </p:txBody>
       </p:sp>
-      <p:sp>
-        <p:nvSpPr>
-          <p:cNvPr id="4" name="Text Placeholder 3">
-            <a:extLst>
-              <a:ext uri="{FF2B5EF4-FFF2-40B4-BE49-F238E27FC236}">
-                <a16:creationId xmlns:a16="http://schemas.microsoft.com/office/drawing/2014/main" id="{A0637C28-B173-4958-AB59-3E1D17EA25CF}"/>
-              </a:ext>
-            </a:extLst>
-          </p:cNvPr>
-          <p:cNvSpPr>
-            <a:spLocks noGrp="1"/>
-          </p:cNvSpPr>
-          <p:nvPr>
-            <p:ph type="body" idx="1"/>
-          </p:nvPr>
-        </p:nvSpPr>
-        <p:spPr/>
-        <p:txBody>
-          <a:bodyPr/>
-          <a:lstStyle/>
-          <a:p>
-            <a:r>
-              <a:rPr lang="en-IN" dirty="0"/>
-              <a:t>Source Code</a:t>
-            </a:r>
-          </a:p>
-        </p:txBody>
-      </p:sp>
-      <p:pic>
-        <p:nvPicPr>
-          <p:cNvPr id="9" name="Content Placeholder 8">
-            <a:extLst>
-              <a:ext uri="{FF2B5EF4-FFF2-40B4-BE49-F238E27FC236}">
-                <a16:creationId xmlns:a16="http://schemas.microsoft.com/office/drawing/2014/main" id="{0437662C-D83E-4CA3-8091-34F0EF5C747B}"/>
-              </a:ext>
-            </a:extLst>
-          </p:cNvPr>
-          <p:cNvPicPr>
-            <a:picLocks noGrp="1" noChangeAspect="1"/>
-          </p:cNvPicPr>
-          <p:nvPr>
-            <p:ph sz="half" idx="2"/>
-          </p:nvPr>
-        </p:nvPicPr>
-        <p:blipFill>
-          <a:blip r:embed="rId2">
-            <a:extLst>
-              <a:ext uri="{BEBA8EAE-BF5A-486C-A8C5-ECC9F3942E4B}">
-                <a14:imgProps xmlns:a14="http://schemas.microsoft.com/office/drawing/2010/main">
-                  <a14:imgLayer r:embed="rId3">
-                    <a14:imgEffect>
-                      <a14:backgroundRemoval t="9846" b="94498" l="6627" r="94880"/>
-                    </a14:imgEffect>
-                  </a14:imgLayer>
-                </a14:imgProps>
-              </a:ext>
-              <a:ext uri="{28A0092B-C50C-407E-A947-70E740481C1C}">
-                <a14:useLocalDpi xmlns:a14="http://schemas.microsoft.com/office/drawing/2010/main" val="0"/>
-              </a:ext>
-            </a:extLst>
-          </a:blip>
-          <a:stretch>
-            <a:fillRect/>
-          </a:stretch>
-        </p:blipFill>
-        <p:spPr>
-          <a:xfrm>
-            <a:off x="1057131" y="2505075"/>
-            <a:ext cx="4723101" cy="3684588"/>
-          </a:xfrm>
-        </p:spPr>
-      </p:pic>
-      <p:sp>
-        <p:nvSpPr>
-          <p:cNvPr id="6" name="Text Placeholder 5">
-            <a:extLst>
-              <a:ext uri="{FF2B5EF4-FFF2-40B4-BE49-F238E27FC236}">
-                <a16:creationId xmlns:a16="http://schemas.microsoft.com/office/drawing/2014/main" id="{8BD99C6F-C425-4022-A3B7-3AE45788E41A}"/>
-              </a:ext>
-            </a:extLst>
-          </p:cNvPr>
-          <p:cNvSpPr>
-            <a:spLocks noGrp="1"/>
-          </p:cNvSpPr>
-          <p:nvPr>
-            <p:ph type="body" sz="quarter" idx="3"/>
-          </p:nvPr>
-        </p:nvSpPr>
-        <p:spPr/>
-        <p:txBody>
-          <a:bodyPr/>
-          <a:lstStyle/>
-          <a:p>
-            <a:r>
-              <a:rPr lang="en-IN" dirty="0"/>
-              <a:t>Output</a:t>
-            </a:r>
-          </a:p>
-        </p:txBody>
-      </p:sp>
       <p:pic>
         <p:nvPicPr>
           <p:cNvPr id="11" name="Content Placeholder 10">
@@ -15709,15 +14771,15 @@
             <a:picLocks noGrp="1" noChangeAspect="1"/>
           </p:cNvPicPr>
           <p:nvPr>
-            <p:ph sz="quarter" idx="4"/>
+            <p:ph idx="1"/>
           </p:nvPr>
         </p:nvPicPr>
         <p:blipFill>
-          <a:blip r:embed="rId4">
+          <a:blip r:embed="rId2">
             <a:extLst>
               <a:ext uri="{BEBA8EAE-BF5A-486C-A8C5-ECC9F3942E4B}">
                 <a14:imgProps xmlns:a14="http://schemas.microsoft.com/office/drawing/2010/main">
-                  <a14:imgLayer r:embed="rId5">
+                  <a14:imgLayer r:embed="rId3">
                     <a14:imgEffect>
                       <a14:backgroundRemoval t="10000" b="90000" l="10000" r="90000"/>
                     </a14:imgEffect>
@@ -15735,8 +14797,8 @@
         </p:blipFill>
         <p:spPr>
           <a:xfrm>
-            <a:off x="6954715" y="2252929"/>
-            <a:ext cx="3618158" cy="4188880"/>
+            <a:off x="4216759" y="1825625"/>
+            <a:ext cx="3758482" cy="4351338"/>
           </a:xfrm>
         </p:spPr>
       </p:pic>
@@ -15756,7 +14818,7 @@
 </p:sld>
 </file>
 
-<file path=ppt/slides/slide9.xml><?xml version="1.0" encoding="utf-8"?>
+<file path=ppt/slides/slide7.xml><?xml version="1.0" encoding="utf-8"?>
 <p:sld xmlns:a="http://schemas.openxmlformats.org/drawingml/2006/main" xmlns:r="http://schemas.openxmlformats.org/officeDocument/2006/relationships" xmlns:p="http://schemas.openxmlformats.org/presentationml/2006/main">
   <p:cSld>
     <p:spTree>
@@ -15801,106 +14863,6 @@
           </a:p>
         </p:txBody>
       </p:sp>
-      <p:sp>
-        <p:nvSpPr>
-          <p:cNvPr id="4" name="Text Placeholder 3">
-            <a:extLst>
-              <a:ext uri="{FF2B5EF4-FFF2-40B4-BE49-F238E27FC236}">
-                <a16:creationId xmlns:a16="http://schemas.microsoft.com/office/drawing/2014/main" id="{0807A71D-B880-4DA5-A662-815BF814D413}"/>
-              </a:ext>
-            </a:extLst>
-          </p:cNvPr>
-          <p:cNvSpPr>
-            <a:spLocks noGrp="1"/>
-          </p:cNvSpPr>
-          <p:nvPr>
-            <p:ph type="body" idx="1"/>
-          </p:nvPr>
-        </p:nvSpPr>
-        <p:spPr/>
-        <p:txBody>
-          <a:bodyPr/>
-          <a:lstStyle/>
-          <a:p>
-            <a:r>
-              <a:rPr lang="en-IN" dirty="0"/>
-              <a:t>Source Code</a:t>
-            </a:r>
-          </a:p>
-        </p:txBody>
-      </p:sp>
-      <p:pic>
-        <p:nvPicPr>
-          <p:cNvPr id="9" name="Content Placeholder 8">
-            <a:extLst>
-              <a:ext uri="{FF2B5EF4-FFF2-40B4-BE49-F238E27FC236}">
-                <a16:creationId xmlns:a16="http://schemas.microsoft.com/office/drawing/2014/main" id="{9FEB4AAE-71E9-480B-8CF6-4349BA1557FB}"/>
-              </a:ext>
-            </a:extLst>
-          </p:cNvPr>
-          <p:cNvPicPr>
-            <a:picLocks noGrp="1" noChangeAspect="1"/>
-          </p:cNvPicPr>
-          <p:nvPr>
-            <p:ph sz="half" idx="2"/>
-          </p:nvPr>
-        </p:nvPicPr>
-        <p:blipFill>
-          <a:blip r:embed="rId2">
-            <a:extLst>
-              <a:ext uri="{BEBA8EAE-BF5A-486C-A8C5-ECC9F3942E4B}">
-                <a14:imgProps xmlns:a14="http://schemas.microsoft.com/office/drawing/2010/main">
-                  <a14:imgLayer r:embed="rId3">
-                    <a14:imgEffect>
-                      <a14:backgroundRemoval t="10000" b="90000" l="7492" r="93974"/>
-                    </a14:imgEffect>
-                  </a14:imgLayer>
-                </a14:imgProps>
-              </a:ext>
-              <a:ext uri="{28A0092B-C50C-407E-A947-70E740481C1C}">
-                <a14:useLocalDpi xmlns:a14="http://schemas.microsoft.com/office/drawing/2010/main" val="0"/>
-              </a:ext>
-            </a:extLst>
-          </a:blip>
-          <a:stretch>
-            <a:fillRect/>
-          </a:stretch>
-        </p:blipFill>
-        <p:spPr>
-          <a:xfrm>
-            <a:off x="839788" y="3255329"/>
-            <a:ext cx="5157787" cy="2184079"/>
-          </a:xfrm>
-        </p:spPr>
-      </p:pic>
-      <p:sp>
-        <p:nvSpPr>
-          <p:cNvPr id="6" name="Text Placeholder 5">
-            <a:extLst>
-              <a:ext uri="{FF2B5EF4-FFF2-40B4-BE49-F238E27FC236}">
-                <a16:creationId xmlns:a16="http://schemas.microsoft.com/office/drawing/2014/main" id="{681714D0-1AE5-4AF2-B488-D6785F729AB7}"/>
-              </a:ext>
-            </a:extLst>
-          </p:cNvPr>
-          <p:cNvSpPr>
-            <a:spLocks noGrp="1"/>
-          </p:cNvSpPr>
-          <p:nvPr>
-            <p:ph type="body" sz="quarter" idx="3"/>
-          </p:nvPr>
-        </p:nvSpPr>
-        <p:spPr/>
-        <p:txBody>
-          <a:bodyPr/>
-          <a:lstStyle/>
-          <a:p>
-            <a:r>
-              <a:rPr lang="en-IN" dirty="0"/>
-              <a:t>Output</a:t>
-            </a:r>
-          </a:p>
-        </p:txBody>
-      </p:sp>
       <p:pic>
         <p:nvPicPr>
           <p:cNvPr id="11" name="Content Placeholder 10">
@@ -15914,15 +14876,15 @@
             <a:picLocks noGrp="1" noChangeAspect="1"/>
           </p:cNvPicPr>
           <p:nvPr>
-            <p:ph sz="quarter" idx="4"/>
+            <p:ph idx="1"/>
           </p:nvPr>
         </p:nvPicPr>
         <p:blipFill>
-          <a:blip r:embed="rId4">
+          <a:blip r:embed="rId2">
             <a:extLst>
               <a:ext uri="{BEBA8EAE-BF5A-486C-A8C5-ECC9F3942E4B}">
                 <a14:imgProps xmlns:a14="http://schemas.microsoft.com/office/drawing/2010/main">
-                  <a14:imgLayer r:embed="rId5">
+                  <a14:imgLayer r:embed="rId3">
                     <a14:imgEffect>
                       <a14:backgroundRemoval t="10000" b="90000" l="3516" r="96338"/>
                     </a14:imgEffect>
@@ -15940,8 +14902,8 @@
         </p:blipFill>
         <p:spPr>
           <a:xfrm>
-            <a:off x="5706208" y="3406804"/>
-            <a:ext cx="6115172" cy="1881130"/>
+            <a:off x="838200" y="2383904"/>
+            <a:ext cx="10515600" cy="3234779"/>
           </a:xfrm>
         </p:spPr>
       </p:pic>
@@ -15949,6 +14911,224 @@
     <p:extLst>
       <p:ext uri="{BB962C8B-B14F-4D97-AF65-F5344CB8AC3E}">
         <p14:creationId xmlns:p14="http://schemas.microsoft.com/office/powerpoint/2010/main" val="1111859773"/>
+      </p:ext>
+    </p:extLst>
+  </p:cSld>
+  <p:clrMapOvr>
+    <a:masterClrMapping/>
+  </p:clrMapOvr>
+  <p:transition spd="slow">
+    <p:cover/>
+  </p:transition>
+</p:sld>
+</file>
+
+<file path=ppt/slides/slide8.xml><?xml version="1.0" encoding="utf-8"?>
+<p:sld xmlns:a="http://schemas.openxmlformats.org/drawingml/2006/main" xmlns:r="http://schemas.openxmlformats.org/officeDocument/2006/relationships" xmlns:p="http://schemas.openxmlformats.org/presentationml/2006/main">
+  <p:cSld>
+    <p:spTree>
+      <p:nvGrpSpPr>
+        <p:cNvPr id="1" name=""/>
+        <p:cNvGrpSpPr/>
+        <p:nvPr/>
+      </p:nvGrpSpPr>
+      <p:grpSpPr>
+        <a:xfrm>
+          <a:off x="0" y="0"/>
+          <a:ext cx="0" cy="0"/>
+          <a:chOff x="0" y="0"/>
+          <a:chExt cx="0" cy="0"/>
+        </a:xfrm>
+      </p:grpSpPr>
+      <p:sp>
+        <p:nvSpPr>
+          <p:cNvPr id="2" name="Title 1">
+            <a:extLst>
+              <a:ext uri="{FF2B5EF4-FFF2-40B4-BE49-F238E27FC236}">
+                <a16:creationId xmlns:a16="http://schemas.microsoft.com/office/drawing/2014/main" id="{ACAD600F-FC22-461F-978C-8BC3CDF34B30}"/>
+              </a:ext>
+            </a:extLst>
+          </p:cNvPr>
+          <p:cNvSpPr>
+            <a:spLocks noGrp="1"/>
+          </p:cNvSpPr>
+          <p:nvPr>
+            <p:ph type="title"/>
+          </p:nvPr>
+        </p:nvSpPr>
+        <p:spPr/>
+        <p:txBody>
+          <a:bodyPr/>
+          <a:lstStyle/>
+          <a:p>
+            <a:r>
+              <a:rPr lang="en-IN" dirty="0"/>
+              <a:t>Normal X-Ray Samples</a:t>
+            </a:r>
+          </a:p>
+        </p:txBody>
+      </p:sp>
+      <p:pic>
+        <p:nvPicPr>
+          <p:cNvPr id="1026" name="Picture 2">
+            <a:extLst>
+              <a:ext uri="{FF2B5EF4-FFF2-40B4-BE49-F238E27FC236}">
+                <a16:creationId xmlns:a16="http://schemas.microsoft.com/office/drawing/2014/main" id="{1E04CBB1-9B46-42D9-BD6A-7CBD96453696}"/>
+              </a:ext>
+            </a:extLst>
+          </p:cNvPr>
+          <p:cNvPicPr>
+            <a:picLocks noGrp="1" noChangeAspect="1" noChangeArrowheads="1"/>
+          </p:cNvPicPr>
+          <p:nvPr>
+            <p:ph idx="1"/>
+          </p:nvPr>
+        </p:nvPicPr>
+        <p:blipFill>
+          <a:blip r:embed="rId2">
+            <a:extLst>
+              <a:ext uri="{28A0092B-C50C-407E-A947-70E740481C1C}">
+                <a14:useLocalDpi xmlns:a14="http://schemas.microsoft.com/office/drawing/2010/main" val="0"/>
+              </a:ext>
+            </a:extLst>
+          </a:blip>
+          <a:stretch>
+            <a:fillRect/>
+          </a:stretch>
+        </p:blipFill>
+        <p:spPr bwMode="auto">
+          <a:xfrm>
+            <a:off x="1430913" y="1825625"/>
+            <a:ext cx="9330174" cy="4351338"/>
+          </a:xfrm>
+          <a:prstGeom prst="rect">
+            <a:avLst/>
+          </a:prstGeom>
+          <a:noFill/>
+          <a:extLst>
+            <a:ext uri="{909E8E84-426E-40DD-AFC4-6F175D3DCCD1}">
+              <a14:hiddenFill xmlns:a14="http://schemas.microsoft.com/office/drawing/2010/main">
+                <a:solidFill>
+                  <a:srgbClr val="FFFFFF"/>
+                </a:solidFill>
+              </a14:hiddenFill>
+            </a:ext>
+          </a:extLst>
+        </p:spPr>
+      </p:pic>
+    </p:spTree>
+    <p:extLst>
+      <p:ext uri="{BB962C8B-B14F-4D97-AF65-F5344CB8AC3E}">
+        <p14:creationId xmlns:p14="http://schemas.microsoft.com/office/powerpoint/2010/main" val="3696035557"/>
+      </p:ext>
+    </p:extLst>
+  </p:cSld>
+  <p:clrMapOvr>
+    <a:masterClrMapping/>
+  </p:clrMapOvr>
+  <p:transition spd="slow">
+    <p:cover/>
+  </p:transition>
+</p:sld>
+</file>
+
+<file path=ppt/slides/slide9.xml><?xml version="1.0" encoding="utf-8"?>
+<p:sld xmlns:a="http://schemas.openxmlformats.org/drawingml/2006/main" xmlns:r="http://schemas.openxmlformats.org/officeDocument/2006/relationships" xmlns:p="http://schemas.openxmlformats.org/presentationml/2006/main">
+  <p:cSld>
+    <p:spTree>
+      <p:nvGrpSpPr>
+        <p:cNvPr id="1" name=""/>
+        <p:cNvGrpSpPr/>
+        <p:nvPr/>
+      </p:nvGrpSpPr>
+      <p:grpSpPr>
+        <a:xfrm>
+          <a:off x="0" y="0"/>
+          <a:ext cx="0" cy="0"/>
+          <a:chOff x="0" y="0"/>
+          <a:chExt cx="0" cy="0"/>
+        </a:xfrm>
+      </p:grpSpPr>
+      <p:sp>
+        <p:nvSpPr>
+          <p:cNvPr id="2" name="Title 1">
+            <a:extLst>
+              <a:ext uri="{FF2B5EF4-FFF2-40B4-BE49-F238E27FC236}">
+                <a16:creationId xmlns:a16="http://schemas.microsoft.com/office/drawing/2014/main" id="{DF88A35C-B14B-4FB6-A8FF-224D339BC14E}"/>
+              </a:ext>
+            </a:extLst>
+          </p:cNvPr>
+          <p:cNvSpPr>
+            <a:spLocks noGrp="1"/>
+          </p:cNvSpPr>
+          <p:nvPr>
+            <p:ph type="title"/>
+          </p:nvPr>
+        </p:nvSpPr>
+        <p:spPr/>
+        <p:txBody>
+          <a:bodyPr/>
+          <a:lstStyle/>
+          <a:p>
+            <a:r>
+              <a:rPr lang="en-IN" dirty="0"/>
+              <a:t>Pneumonia X-Ray Samples</a:t>
+            </a:r>
+          </a:p>
+        </p:txBody>
+      </p:sp>
+      <p:pic>
+        <p:nvPicPr>
+          <p:cNvPr id="2050" name="Picture 2">
+            <a:extLst>
+              <a:ext uri="{FF2B5EF4-FFF2-40B4-BE49-F238E27FC236}">
+                <a16:creationId xmlns:a16="http://schemas.microsoft.com/office/drawing/2014/main" id="{B55C4DA4-37D2-45D6-9177-6BAF26777A8D}"/>
+              </a:ext>
+            </a:extLst>
+          </p:cNvPr>
+          <p:cNvPicPr>
+            <a:picLocks noGrp="1" noChangeAspect="1" noChangeArrowheads="1"/>
+          </p:cNvPicPr>
+          <p:nvPr>
+            <p:ph idx="1"/>
+          </p:nvPr>
+        </p:nvPicPr>
+        <p:blipFill>
+          <a:blip r:embed="rId2">
+            <a:extLst>
+              <a:ext uri="{28A0092B-C50C-407E-A947-70E740481C1C}">
+                <a14:useLocalDpi xmlns:a14="http://schemas.microsoft.com/office/drawing/2010/main" val="0"/>
+              </a:ext>
+            </a:extLst>
+          </a:blip>
+          <a:stretch>
+            <a:fillRect/>
+          </a:stretch>
+        </p:blipFill>
+        <p:spPr bwMode="auto">
+          <a:xfrm>
+            <a:off x="1199395" y="1825625"/>
+            <a:ext cx="9793210" cy="4351338"/>
+          </a:xfrm>
+          <a:prstGeom prst="rect">
+            <a:avLst/>
+          </a:prstGeom>
+          <a:noFill/>
+          <a:extLst>
+            <a:ext uri="{909E8E84-426E-40DD-AFC4-6F175D3DCCD1}">
+              <a14:hiddenFill xmlns:a14="http://schemas.microsoft.com/office/drawing/2010/main">
+                <a:solidFill>
+                  <a:srgbClr val="FFFFFF"/>
+                </a:solidFill>
+              </a14:hiddenFill>
+            </a:ext>
+          </a:extLst>
+        </p:spPr>
+      </p:pic>
+    </p:spTree>
+    <p:extLst>
+      <p:ext uri="{BB962C8B-B14F-4D97-AF65-F5344CB8AC3E}">
+        <p14:creationId xmlns:p14="http://schemas.microsoft.com/office/powerpoint/2010/main" val="1688930048"/>
       </p:ext>
     </p:extLst>
   </p:cSld>

</xml_diff>